<commit_message>
changed to title in english
</commit_message>
<xml_diff>
--- a/presentation/presentation.pptx
+++ b/presentation/presentation.pptx
@@ -218,7 +218,7 @@
           <a:bodyPr lIns="0" rIns="0" tIns="0" bIns="0" anchor="b"/>
           <a:p>
             <a:pPr algn="r"/>
-            <a:fld id="{F46753AF-A1C7-4DEE-83B2-50E5EE8B57B4}" type="slidenum">
+            <a:fld id="{6927C47B-127A-40F1-8914-77AF96456A2C}" type="slidenum">
               <a:rPr lang="en-US" sz="1400">
                 <a:latin typeface="Times New Roman"/>
               </a:rPr>
@@ -260,7 +260,7 @@
         <p:spPr>
           <a:xfrm>
             <a:off x="5797440" y="6743880"/>
-            <a:ext cx="4429800" cy="348480"/>
+            <a:ext cx="4429440" cy="348120"/>
           </a:xfrm>
           <a:prstGeom prst="rect">
             <a:avLst/>
@@ -278,7 +278,7 @@
                 <a:spcPct val="100000"/>
               </a:lnSpc>
             </a:pPr>
-            <a:fld id="{8DC51C84-4FF5-4732-921E-C3CCEF171580}" type="slidenum">
+            <a:fld id="{65C938E9-6551-4517-BE6A-F72E6A52E831}" type="slidenum">
               <a:rPr lang="en-US" sz="1300">
                 <a:solidFill>
                   <a:srgbClr val="000000"/>
@@ -305,7 +305,7 @@
         <p:spPr>
           <a:xfrm>
             <a:off x="1023840" y="3373560"/>
-            <a:ext cx="8182800" cy="3188520"/>
+            <a:ext cx="8182440" cy="3188160"/>
           </a:xfrm>
           <a:prstGeom prst="rect">
             <a:avLst/>
@@ -327,7 +327,7 @@
         <p:spPr>
           <a:xfrm>
             <a:off x="5797440" y="6743880"/>
-            <a:ext cx="4431600" cy="349920"/>
+            <a:ext cx="4431240" cy="349560"/>
           </a:xfrm>
           <a:prstGeom prst="rect">
             <a:avLst/>
@@ -345,7 +345,7 @@
                 <a:spcPct val="100000"/>
               </a:lnSpc>
             </a:pPr>
-            <a:fld id="{26324311-8B4B-460C-AD53-F5889995378D}" type="slidenum">
+            <a:fld id="{C7962542-9D9E-4153-BB70-0DBB24C14C85}" type="slidenum">
               <a:rPr lang="en-US" sz="1300">
                 <a:solidFill>
                   <a:srgbClr val="000000"/>
@@ -8503,7 +8503,7 @@
         <p:spPr>
           <a:xfrm>
             <a:off x="7715160" y="6093000"/>
-            <a:ext cx="712080" cy="710280"/>
+            <a:ext cx="711720" cy="709920"/>
           </a:xfrm>
           <a:prstGeom prst="rect">
             <a:avLst/>
@@ -8523,7 +8523,7 @@
         <p:spPr>
           <a:xfrm>
             <a:off x="8501040" y="6524280"/>
-            <a:ext cx="642240" cy="1080"/>
+            <a:ext cx="641880" cy="720"/>
           </a:xfrm>
           <a:prstGeom prst="straightConnector1">
             <a:avLst/>
@@ -8546,7 +8546,7 @@
         <p:spPr>
           <a:xfrm>
             <a:off x="5715000" y="6235560"/>
-            <a:ext cx="1853280" cy="573840"/>
+            <a:ext cx="1852920" cy="573480"/>
           </a:xfrm>
           <a:prstGeom prst="rect">
             <a:avLst/>
@@ -8566,7 +8566,7 @@
         <p:spPr>
           <a:xfrm>
             <a:off x="0" y="6524280"/>
-            <a:ext cx="5571360" cy="1080"/>
+            <a:ext cx="5571000" cy="720"/>
           </a:xfrm>
           <a:prstGeom prst="straightConnector1">
             <a:avLst/>
@@ -8589,7 +8589,7 @@
         <p:spPr>
           <a:xfrm>
             <a:off x="3124080" y="6356520"/>
-            <a:ext cx="2891520" cy="361080"/>
+            <a:ext cx="2891160" cy="360720"/>
           </a:xfrm>
           <a:prstGeom prst="rect">
             <a:avLst/>
@@ -8609,7 +8609,7 @@
         <p:spPr>
           <a:xfrm>
             <a:off x="395640" y="6556320"/>
-            <a:ext cx="4677480" cy="269280"/>
+            <a:ext cx="4677120" cy="268920"/>
           </a:xfrm>
           <a:prstGeom prst="rect">
             <a:avLst/>
@@ -8656,7 +8656,7 @@
         <p:spPr>
           <a:xfrm>
             <a:off x="5644080" y="6109920"/>
-            <a:ext cx="2012400" cy="625320"/>
+            <a:ext cx="2012040" cy="624960"/>
           </a:xfrm>
           <a:prstGeom prst="rect">
             <a:avLst/>
@@ -8681,7 +8681,7 @@
         <p:spPr>
           <a:xfrm>
             <a:off x="7657200" y="6023160"/>
-            <a:ext cx="712080" cy="712080"/>
+            <a:ext cx="711720" cy="711720"/>
           </a:xfrm>
           <a:prstGeom prst="rect">
             <a:avLst/>
@@ -8898,7 +8898,7 @@
         <p:spPr>
           <a:xfrm>
             <a:off x="7715160" y="6093000"/>
-            <a:ext cx="712080" cy="710280"/>
+            <a:ext cx="711720" cy="709920"/>
           </a:xfrm>
           <a:prstGeom prst="rect">
             <a:avLst/>
@@ -8918,7 +8918,7 @@
         <p:spPr>
           <a:xfrm>
             <a:off x="8501040" y="6524280"/>
-            <a:ext cx="642240" cy="1080"/>
+            <a:ext cx="641880" cy="720"/>
           </a:xfrm>
           <a:prstGeom prst="straightConnector1">
             <a:avLst/>
@@ -8941,7 +8941,7 @@
         <p:spPr>
           <a:xfrm>
             <a:off x="5715000" y="6235560"/>
-            <a:ext cx="1853280" cy="573840"/>
+            <a:ext cx="1852920" cy="573480"/>
           </a:xfrm>
           <a:prstGeom prst="rect">
             <a:avLst/>
@@ -8961,7 +8961,7 @@
         <p:spPr>
           <a:xfrm>
             <a:off x="0" y="6524280"/>
-            <a:ext cx="5571360" cy="1080"/>
+            <a:ext cx="5571000" cy="720"/>
           </a:xfrm>
           <a:prstGeom prst="straightConnector1">
             <a:avLst/>
@@ -8984,7 +8984,7 @@
         <p:spPr>
           <a:xfrm>
             <a:off x="7715160" y="6093000"/>
-            <a:ext cx="712080" cy="710280"/>
+            <a:ext cx="711720" cy="709920"/>
           </a:xfrm>
           <a:prstGeom prst="rect">
             <a:avLst/>
@@ -9004,7 +9004,7 @@
         <p:spPr>
           <a:xfrm>
             <a:off x="8501040" y="6524280"/>
-            <a:ext cx="642240" cy="1080"/>
+            <a:ext cx="641880" cy="720"/>
           </a:xfrm>
           <a:prstGeom prst="straightConnector1">
             <a:avLst/>
@@ -9027,7 +9027,7 @@
         <p:spPr>
           <a:xfrm>
             <a:off x="5715000" y="6235560"/>
-            <a:ext cx="1853280" cy="573840"/>
+            <a:ext cx="1852920" cy="573480"/>
           </a:xfrm>
           <a:prstGeom prst="rect">
             <a:avLst/>
@@ -9047,7 +9047,7 @@
         <p:spPr>
           <a:xfrm>
             <a:off x="0" y="6524280"/>
-            <a:ext cx="5571360" cy="1080"/>
+            <a:ext cx="5571000" cy="720"/>
           </a:xfrm>
           <a:prstGeom prst="straightConnector1">
             <a:avLst/>
@@ -9070,7 +9070,7 @@
         <p:spPr>
           <a:xfrm>
             <a:off x="108000" y="6568920"/>
-            <a:ext cx="1004040" cy="285120"/>
+            <a:ext cx="1003680" cy="284760"/>
           </a:xfrm>
           <a:prstGeom prst="rect">
             <a:avLst/>
@@ -9090,7 +9090,7 @@
         <p:spPr>
           <a:xfrm>
             <a:off x="0" y="1143000"/>
-            <a:ext cx="9143280" cy="720"/>
+            <a:ext cx="9142920" cy="360"/>
           </a:xfrm>
           <a:prstGeom prst="straightConnector1">
             <a:avLst/>
@@ -9113,7 +9113,7 @@
         <p:spPr>
           <a:xfrm>
             <a:off x="3124080" y="6356520"/>
-            <a:ext cx="2891520" cy="361080"/>
+            <a:ext cx="2891160" cy="360720"/>
           </a:xfrm>
           <a:prstGeom prst="rect">
             <a:avLst/>
@@ -9133,7 +9133,7 @@
         <p:spPr>
           <a:xfrm>
             <a:off x="466560" y="6556320"/>
-            <a:ext cx="4677480" cy="269280"/>
+            <a:ext cx="4677120" cy="268920"/>
           </a:xfrm>
           <a:prstGeom prst="rect">
             <a:avLst/>
@@ -9180,7 +9180,7 @@
         <p:spPr>
           <a:xfrm>
             <a:off x="5644080" y="6109920"/>
-            <a:ext cx="2012400" cy="625320"/>
+            <a:ext cx="2012040" cy="624960"/>
           </a:xfrm>
           <a:prstGeom prst="rect">
             <a:avLst/>
@@ -9205,7 +9205,7 @@
         <p:spPr>
           <a:xfrm>
             <a:off x="7657200" y="6023160"/>
-            <a:ext cx="712080" cy="712080"/>
+            <a:ext cx="711720" cy="711720"/>
           </a:xfrm>
           <a:prstGeom prst="rect">
             <a:avLst/>
@@ -9422,7 +9422,7 @@
         <p:spPr>
           <a:xfrm>
             <a:off x="7715160" y="6093000"/>
-            <a:ext cx="712080" cy="710280"/>
+            <a:ext cx="711720" cy="709920"/>
           </a:xfrm>
           <a:prstGeom prst="rect">
             <a:avLst/>
@@ -9442,7 +9442,7 @@
         <p:spPr>
           <a:xfrm>
             <a:off x="8501040" y="6524280"/>
-            <a:ext cx="642240" cy="1080"/>
+            <a:ext cx="641880" cy="720"/>
           </a:xfrm>
           <a:prstGeom prst="straightConnector1">
             <a:avLst/>
@@ -9465,7 +9465,7 @@
         <p:spPr>
           <a:xfrm>
             <a:off x="5715000" y="6235560"/>
-            <a:ext cx="1853280" cy="573840"/>
+            <a:ext cx="1852920" cy="573480"/>
           </a:xfrm>
           <a:prstGeom prst="rect">
             <a:avLst/>
@@ -9485,7 +9485,7 @@
         <p:spPr>
           <a:xfrm>
             <a:off x="0" y="6524280"/>
-            <a:ext cx="5571360" cy="1080"/>
+            <a:ext cx="5571000" cy="720"/>
           </a:xfrm>
           <a:prstGeom prst="straightConnector1">
             <a:avLst/>
@@ -9508,7 +9508,7 @@
         <p:spPr>
           <a:xfrm>
             <a:off x="7715160" y="6093000"/>
-            <a:ext cx="712080" cy="710280"/>
+            <a:ext cx="711720" cy="709920"/>
           </a:xfrm>
           <a:prstGeom prst="rect">
             <a:avLst/>
@@ -9528,7 +9528,7 @@
         <p:spPr>
           <a:xfrm>
             <a:off x="8501040" y="6524280"/>
-            <a:ext cx="642240" cy="1080"/>
+            <a:ext cx="641880" cy="720"/>
           </a:xfrm>
           <a:prstGeom prst="straightConnector1">
             <a:avLst/>
@@ -9551,7 +9551,7 @@
         <p:spPr>
           <a:xfrm>
             <a:off x="5715000" y="6235560"/>
-            <a:ext cx="1853280" cy="573840"/>
+            <a:ext cx="1852920" cy="573480"/>
           </a:xfrm>
           <a:prstGeom prst="rect">
             <a:avLst/>
@@ -9571,7 +9571,7 @@
         <p:spPr>
           <a:xfrm>
             <a:off x="0" y="6524280"/>
-            <a:ext cx="5571360" cy="1080"/>
+            <a:ext cx="5571000" cy="720"/>
           </a:xfrm>
           <a:prstGeom prst="straightConnector1">
             <a:avLst/>
@@ -9594,7 +9594,7 @@
         <p:spPr>
           <a:xfrm>
             <a:off x="108000" y="6568920"/>
-            <a:ext cx="1004040" cy="285120"/>
+            <a:ext cx="1003680" cy="284760"/>
           </a:xfrm>
           <a:prstGeom prst="rect">
             <a:avLst/>
@@ -9614,7 +9614,7 @@
         <p:spPr>
           <a:xfrm>
             <a:off x="0" y="1143000"/>
-            <a:ext cx="9143280" cy="720"/>
+            <a:ext cx="9142920" cy="360"/>
           </a:xfrm>
           <a:prstGeom prst="straightConnector1">
             <a:avLst/>
@@ -9637,7 +9637,7 @@
         <p:spPr>
           <a:xfrm>
             <a:off x="3124080" y="6356520"/>
-            <a:ext cx="2891520" cy="361080"/>
+            <a:ext cx="2891160" cy="360720"/>
           </a:xfrm>
           <a:prstGeom prst="rect">
             <a:avLst/>
@@ -9657,7 +9657,7 @@
         <p:spPr>
           <a:xfrm>
             <a:off x="466560" y="6556320"/>
-            <a:ext cx="4677480" cy="269280"/>
+            <a:ext cx="4677120" cy="268920"/>
           </a:xfrm>
           <a:prstGeom prst="rect">
             <a:avLst/>
@@ -9704,7 +9704,7 @@
         <p:spPr>
           <a:xfrm>
             <a:off x="7657200" y="6023160"/>
-            <a:ext cx="712080" cy="712080"/>
+            <a:ext cx="711720" cy="711720"/>
           </a:xfrm>
           <a:prstGeom prst="rect">
             <a:avLst/>
@@ -9729,7 +9729,7 @@
         <p:spPr>
           <a:xfrm>
             <a:off x="5644080" y="6109920"/>
-            <a:ext cx="2012400" cy="625320"/>
+            <a:ext cx="2012040" cy="624960"/>
           </a:xfrm>
           <a:prstGeom prst="rect">
             <a:avLst/>
@@ -9946,7 +9946,7 @@
         <p:spPr>
           <a:xfrm>
             <a:off x="7715160" y="6093000"/>
-            <a:ext cx="712080" cy="710280"/>
+            <a:ext cx="711720" cy="709920"/>
           </a:xfrm>
           <a:prstGeom prst="rect">
             <a:avLst/>
@@ -9966,7 +9966,7 @@
         <p:spPr>
           <a:xfrm>
             <a:off x="8501040" y="6524280"/>
-            <a:ext cx="642240" cy="1080"/>
+            <a:ext cx="641880" cy="720"/>
           </a:xfrm>
           <a:prstGeom prst="straightConnector1">
             <a:avLst/>
@@ -9989,7 +9989,7 @@
         <p:spPr>
           <a:xfrm>
             <a:off x="5715000" y="6235560"/>
-            <a:ext cx="1853280" cy="573840"/>
+            <a:ext cx="1852920" cy="573480"/>
           </a:xfrm>
           <a:prstGeom prst="rect">
             <a:avLst/>
@@ -10009,7 +10009,7 @@
         <p:spPr>
           <a:xfrm>
             <a:off x="0" y="6524280"/>
-            <a:ext cx="5571360" cy="1080"/>
+            <a:ext cx="5571000" cy="720"/>
           </a:xfrm>
           <a:prstGeom prst="straightConnector1">
             <a:avLst/>
@@ -10032,7 +10032,7 @@
         <p:spPr>
           <a:xfrm>
             <a:off x="7715160" y="6093000"/>
-            <a:ext cx="712080" cy="710280"/>
+            <a:ext cx="711720" cy="709920"/>
           </a:xfrm>
           <a:prstGeom prst="rect">
             <a:avLst/>
@@ -10052,7 +10052,7 @@
         <p:spPr>
           <a:xfrm>
             <a:off x="8501040" y="6524280"/>
-            <a:ext cx="642240" cy="1080"/>
+            <a:ext cx="641880" cy="720"/>
           </a:xfrm>
           <a:prstGeom prst="straightConnector1">
             <a:avLst/>
@@ -10075,7 +10075,7 @@
         <p:spPr>
           <a:xfrm>
             <a:off x="5715000" y="6235560"/>
-            <a:ext cx="1853280" cy="573840"/>
+            <a:ext cx="1852920" cy="573480"/>
           </a:xfrm>
           <a:prstGeom prst="rect">
             <a:avLst/>
@@ -10095,7 +10095,7 @@
         <p:spPr>
           <a:xfrm>
             <a:off x="0" y="6524280"/>
-            <a:ext cx="5571360" cy="1080"/>
+            <a:ext cx="5571000" cy="720"/>
           </a:xfrm>
           <a:prstGeom prst="straightConnector1">
             <a:avLst/>
@@ -10118,7 +10118,7 @@
         <p:spPr>
           <a:xfrm>
             <a:off x="108000" y="6568920"/>
-            <a:ext cx="1004040" cy="285120"/>
+            <a:ext cx="1003680" cy="284760"/>
           </a:xfrm>
           <a:prstGeom prst="rect">
             <a:avLst/>
@@ -10138,7 +10138,7 @@
         <p:spPr>
           <a:xfrm>
             <a:off x="0" y="1143000"/>
-            <a:ext cx="9143280" cy="720"/>
+            <a:ext cx="9142920" cy="360"/>
           </a:xfrm>
           <a:prstGeom prst="straightConnector1">
             <a:avLst/>
@@ -10161,7 +10161,7 @@
         <p:spPr>
           <a:xfrm>
             <a:off x="3124080" y="6356520"/>
-            <a:ext cx="2891520" cy="361080"/>
+            <a:ext cx="2891160" cy="360720"/>
           </a:xfrm>
           <a:prstGeom prst="rect">
             <a:avLst/>
@@ -10181,7 +10181,7 @@
         <p:spPr>
           <a:xfrm>
             <a:off x="466560" y="6556320"/>
-            <a:ext cx="4677480" cy="269280"/>
+            <a:ext cx="4677120" cy="268920"/>
           </a:xfrm>
           <a:prstGeom prst="rect">
             <a:avLst/>
@@ -10228,7 +10228,7 @@
         <p:spPr>
           <a:xfrm>
             <a:off x="7657200" y="6023160"/>
-            <a:ext cx="712080" cy="712080"/>
+            <a:ext cx="711720" cy="711720"/>
           </a:xfrm>
           <a:prstGeom prst="rect">
             <a:avLst/>
@@ -10253,7 +10253,7 @@
         <p:spPr>
           <a:xfrm>
             <a:off x="5644080" y="6109920"/>
-            <a:ext cx="2012400" cy="625320"/>
+            <a:ext cx="2012040" cy="624960"/>
           </a:xfrm>
           <a:prstGeom prst="rect">
             <a:avLst/>
@@ -10470,7 +10470,7 @@
         <p:spPr>
           <a:xfrm>
             <a:off x="7715160" y="6093000"/>
-            <a:ext cx="712080" cy="710280"/>
+            <a:ext cx="711720" cy="709920"/>
           </a:xfrm>
           <a:prstGeom prst="rect">
             <a:avLst/>
@@ -10490,7 +10490,7 @@
         <p:spPr>
           <a:xfrm>
             <a:off x="8501040" y="6524280"/>
-            <a:ext cx="642240" cy="1080"/>
+            <a:ext cx="641880" cy="720"/>
           </a:xfrm>
           <a:prstGeom prst="straightConnector1">
             <a:avLst/>
@@ -10513,7 +10513,7 @@
         <p:spPr>
           <a:xfrm>
             <a:off x="5715000" y="6235560"/>
-            <a:ext cx="1853280" cy="573840"/>
+            <a:ext cx="1852920" cy="573480"/>
           </a:xfrm>
           <a:prstGeom prst="rect">
             <a:avLst/>
@@ -10533,7 +10533,7 @@
         <p:spPr>
           <a:xfrm>
             <a:off x="0" y="6524280"/>
-            <a:ext cx="5571360" cy="1080"/>
+            <a:ext cx="5571000" cy="720"/>
           </a:xfrm>
           <a:prstGeom prst="straightConnector1">
             <a:avLst/>
@@ -10556,7 +10556,7 @@
         <p:spPr>
           <a:xfrm>
             <a:off x="7715160" y="6093000"/>
-            <a:ext cx="712080" cy="710280"/>
+            <a:ext cx="711720" cy="709920"/>
           </a:xfrm>
           <a:prstGeom prst="rect">
             <a:avLst/>
@@ -10576,7 +10576,7 @@
         <p:spPr>
           <a:xfrm>
             <a:off x="8501040" y="6524280"/>
-            <a:ext cx="642240" cy="1080"/>
+            <a:ext cx="641880" cy="720"/>
           </a:xfrm>
           <a:prstGeom prst="straightConnector1">
             <a:avLst/>
@@ -10599,7 +10599,7 @@
         <p:spPr>
           <a:xfrm>
             <a:off x="5715000" y="6235560"/>
-            <a:ext cx="1853280" cy="573840"/>
+            <a:ext cx="1852920" cy="573480"/>
           </a:xfrm>
           <a:prstGeom prst="rect">
             <a:avLst/>
@@ -10619,7 +10619,7 @@
         <p:spPr>
           <a:xfrm>
             <a:off x="0" y="6524280"/>
-            <a:ext cx="5571360" cy="1080"/>
+            <a:ext cx="5571000" cy="720"/>
           </a:xfrm>
           <a:prstGeom prst="straightConnector1">
             <a:avLst/>
@@ -10642,7 +10642,7 @@
         <p:spPr>
           <a:xfrm>
             <a:off x="108000" y="6568920"/>
-            <a:ext cx="1004040" cy="285120"/>
+            <a:ext cx="1003680" cy="284760"/>
           </a:xfrm>
           <a:prstGeom prst="rect">
             <a:avLst/>
@@ -10662,7 +10662,7 @@
         <p:spPr>
           <a:xfrm>
             <a:off x="0" y="1143000"/>
-            <a:ext cx="9143280" cy="720"/>
+            <a:ext cx="9142920" cy="360"/>
           </a:xfrm>
           <a:prstGeom prst="straightConnector1">
             <a:avLst/>
@@ -10685,7 +10685,7 @@
         <p:spPr>
           <a:xfrm>
             <a:off x="3124080" y="6356520"/>
-            <a:ext cx="2891520" cy="361080"/>
+            <a:ext cx="2891160" cy="360720"/>
           </a:xfrm>
           <a:prstGeom prst="rect">
             <a:avLst/>
@@ -10705,7 +10705,7 @@
         <p:spPr>
           <a:xfrm>
             <a:off x="466560" y="6556320"/>
-            <a:ext cx="4677480" cy="269280"/>
+            <a:ext cx="4677120" cy="268920"/>
           </a:xfrm>
           <a:prstGeom prst="rect">
             <a:avLst/>
@@ -10752,7 +10752,7 @@
         <p:spPr>
           <a:xfrm>
             <a:off x="7657200" y="6023160"/>
-            <a:ext cx="712080" cy="712080"/>
+            <a:ext cx="711720" cy="711720"/>
           </a:xfrm>
           <a:prstGeom prst="rect">
             <a:avLst/>
@@ -10777,7 +10777,7 @@
         <p:spPr>
           <a:xfrm>
             <a:off x="5644080" y="6109920"/>
-            <a:ext cx="2012400" cy="625320"/>
+            <a:ext cx="2012040" cy="624960"/>
           </a:xfrm>
           <a:prstGeom prst="rect">
             <a:avLst/>
@@ -10994,7 +10994,7 @@
         <p:spPr>
           <a:xfrm>
             <a:off x="7715160" y="6093000"/>
-            <a:ext cx="712080" cy="710280"/>
+            <a:ext cx="711720" cy="709920"/>
           </a:xfrm>
           <a:prstGeom prst="rect">
             <a:avLst/>
@@ -11014,7 +11014,7 @@
         <p:spPr>
           <a:xfrm>
             <a:off x="8501040" y="6524280"/>
-            <a:ext cx="642240" cy="1080"/>
+            <a:ext cx="641880" cy="720"/>
           </a:xfrm>
           <a:prstGeom prst="straightConnector1">
             <a:avLst/>
@@ -11037,7 +11037,7 @@
         <p:spPr>
           <a:xfrm>
             <a:off x="5715000" y="6235560"/>
-            <a:ext cx="1853280" cy="573840"/>
+            <a:ext cx="1852920" cy="573480"/>
           </a:xfrm>
           <a:prstGeom prst="rect">
             <a:avLst/>
@@ -11057,7 +11057,7 @@
         <p:spPr>
           <a:xfrm>
             <a:off x="0" y="6524280"/>
-            <a:ext cx="5571360" cy="1080"/>
+            <a:ext cx="5571000" cy="720"/>
           </a:xfrm>
           <a:prstGeom prst="straightConnector1">
             <a:avLst/>
@@ -11080,7 +11080,7 @@
         <p:spPr>
           <a:xfrm>
             <a:off x="7715160" y="6093000"/>
-            <a:ext cx="712080" cy="710280"/>
+            <a:ext cx="711720" cy="709920"/>
           </a:xfrm>
           <a:prstGeom prst="rect">
             <a:avLst/>
@@ -11100,7 +11100,7 @@
         <p:spPr>
           <a:xfrm>
             <a:off x="8501040" y="6524280"/>
-            <a:ext cx="642240" cy="1080"/>
+            <a:ext cx="641880" cy="720"/>
           </a:xfrm>
           <a:prstGeom prst="straightConnector1">
             <a:avLst/>
@@ -11123,7 +11123,7 @@
         <p:spPr>
           <a:xfrm>
             <a:off x="5715000" y="6235560"/>
-            <a:ext cx="1853280" cy="573840"/>
+            <a:ext cx="1852920" cy="573480"/>
           </a:xfrm>
           <a:prstGeom prst="rect">
             <a:avLst/>
@@ -11143,7 +11143,7 @@
         <p:spPr>
           <a:xfrm>
             <a:off x="0" y="6524280"/>
-            <a:ext cx="5571360" cy="1080"/>
+            <a:ext cx="5571000" cy="720"/>
           </a:xfrm>
           <a:prstGeom prst="straightConnector1">
             <a:avLst/>
@@ -11166,7 +11166,7 @@
         <p:spPr>
           <a:xfrm>
             <a:off x="108000" y="6568920"/>
-            <a:ext cx="1004040" cy="285120"/>
+            <a:ext cx="1003680" cy="284760"/>
           </a:xfrm>
           <a:prstGeom prst="rect">
             <a:avLst/>
@@ -11186,7 +11186,7 @@
         <p:spPr>
           <a:xfrm>
             <a:off x="0" y="1143000"/>
-            <a:ext cx="9143280" cy="720"/>
+            <a:ext cx="9142920" cy="360"/>
           </a:xfrm>
           <a:prstGeom prst="straightConnector1">
             <a:avLst/>
@@ -11209,7 +11209,7 @@
         <p:spPr>
           <a:xfrm>
             <a:off x="3124080" y="6356520"/>
-            <a:ext cx="2891520" cy="361080"/>
+            <a:ext cx="2891160" cy="360720"/>
           </a:xfrm>
           <a:prstGeom prst="rect">
             <a:avLst/>
@@ -11229,7 +11229,7 @@
         <p:spPr>
           <a:xfrm>
             <a:off x="466560" y="6556320"/>
-            <a:ext cx="4677480" cy="269280"/>
+            <a:ext cx="4677120" cy="268920"/>
           </a:xfrm>
           <a:prstGeom prst="rect">
             <a:avLst/>
@@ -11276,7 +11276,7 @@
         <p:spPr>
           <a:xfrm>
             <a:off x="7657200" y="6023160"/>
-            <a:ext cx="712080" cy="712080"/>
+            <a:ext cx="711720" cy="711720"/>
           </a:xfrm>
           <a:prstGeom prst="rect">
             <a:avLst/>
@@ -11301,7 +11301,7 @@
         <p:spPr>
           <a:xfrm>
             <a:off x="5644080" y="6109920"/>
-            <a:ext cx="2012400" cy="625320"/>
+            <a:ext cx="2012040" cy="624960"/>
           </a:xfrm>
           <a:prstGeom prst="rect">
             <a:avLst/>
@@ -11518,7 +11518,7 @@
         <p:spPr>
           <a:xfrm>
             <a:off x="7715160" y="6093000"/>
-            <a:ext cx="712080" cy="710280"/>
+            <a:ext cx="711720" cy="709920"/>
           </a:xfrm>
           <a:prstGeom prst="rect">
             <a:avLst/>
@@ -11538,7 +11538,7 @@
         <p:spPr>
           <a:xfrm>
             <a:off x="8501040" y="6524280"/>
-            <a:ext cx="642240" cy="1080"/>
+            <a:ext cx="641880" cy="720"/>
           </a:xfrm>
           <a:prstGeom prst="straightConnector1">
             <a:avLst/>
@@ -11561,7 +11561,7 @@
         <p:spPr>
           <a:xfrm>
             <a:off x="5715000" y="6235560"/>
-            <a:ext cx="1853280" cy="573840"/>
+            <a:ext cx="1852920" cy="573480"/>
           </a:xfrm>
           <a:prstGeom prst="rect">
             <a:avLst/>
@@ -11581,7 +11581,7 @@
         <p:spPr>
           <a:xfrm>
             <a:off x="0" y="6524280"/>
-            <a:ext cx="5571360" cy="1080"/>
+            <a:ext cx="5571000" cy="720"/>
           </a:xfrm>
           <a:prstGeom prst="straightConnector1">
             <a:avLst/>
@@ -11604,7 +11604,7 @@
         <p:spPr>
           <a:xfrm>
             <a:off x="7715160" y="6093000"/>
-            <a:ext cx="712080" cy="710280"/>
+            <a:ext cx="711720" cy="709920"/>
           </a:xfrm>
           <a:prstGeom prst="rect">
             <a:avLst/>
@@ -11624,7 +11624,7 @@
         <p:spPr>
           <a:xfrm>
             <a:off x="8501040" y="6524280"/>
-            <a:ext cx="642240" cy="1080"/>
+            <a:ext cx="641880" cy="720"/>
           </a:xfrm>
           <a:prstGeom prst="straightConnector1">
             <a:avLst/>
@@ -11647,7 +11647,7 @@
         <p:spPr>
           <a:xfrm>
             <a:off x="5715000" y="6235560"/>
-            <a:ext cx="1853280" cy="573840"/>
+            <a:ext cx="1852920" cy="573480"/>
           </a:xfrm>
           <a:prstGeom prst="rect">
             <a:avLst/>
@@ -11667,7 +11667,7 @@
         <p:spPr>
           <a:xfrm>
             <a:off x="0" y="6524280"/>
-            <a:ext cx="5571360" cy="1080"/>
+            <a:ext cx="5571000" cy="720"/>
           </a:xfrm>
           <a:prstGeom prst="straightConnector1">
             <a:avLst/>
@@ -11690,7 +11690,7 @@
         <p:spPr>
           <a:xfrm>
             <a:off x="108000" y="6568920"/>
-            <a:ext cx="1004040" cy="285120"/>
+            <a:ext cx="1003680" cy="284760"/>
           </a:xfrm>
           <a:prstGeom prst="rect">
             <a:avLst/>
@@ -11710,7 +11710,7 @@
         <p:spPr>
           <a:xfrm>
             <a:off x="0" y="1143000"/>
-            <a:ext cx="9143280" cy="720"/>
+            <a:ext cx="9142920" cy="360"/>
           </a:xfrm>
           <a:prstGeom prst="straightConnector1">
             <a:avLst/>
@@ -11733,7 +11733,7 @@
         <p:spPr>
           <a:xfrm>
             <a:off x="3124080" y="6356520"/>
-            <a:ext cx="2891520" cy="361080"/>
+            <a:ext cx="2891160" cy="360720"/>
           </a:xfrm>
           <a:prstGeom prst="rect">
             <a:avLst/>
@@ -11753,7 +11753,7 @@
         <p:spPr>
           <a:xfrm>
             <a:off x="466560" y="6556320"/>
-            <a:ext cx="4677480" cy="269280"/>
+            <a:ext cx="4677120" cy="268920"/>
           </a:xfrm>
           <a:prstGeom prst="rect">
             <a:avLst/>
@@ -11800,7 +11800,7 @@
         <p:spPr>
           <a:xfrm>
             <a:off x="7657200" y="6023160"/>
-            <a:ext cx="712080" cy="712080"/>
+            <a:ext cx="711720" cy="711720"/>
           </a:xfrm>
           <a:prstGeom prst="rect">
             <a:avLst/>
@@ -11825,7 +11825,7 @@
         <p:spPr>
           <a:xfrm>
             <a:off x="5644080" y="6109920"/>
-            <a:ext cx="2012400" cy="625320"/>
+            <a:ext cx="2012040" cy="624960"/>
           </a:xfrm>
           <a:prstGeom prst="rect">
             <a:avLst/>
@@ -12034,8 +12034,8 @@
         </p:nvSpPr>
         <p:spPr>
           <a:xfrm>
-            <a:off x="640800" y="1154160"/>
-            <a:ext cx="7768440" cy="1677240"/>
+            <a:off x="640080" y="1188720"/>
+            <a:ext cx="7768080" cy="1676880"/>
           </a:xfrm>
           <a:prstGeom prst="rect">
             <a:avLst/>
@@ -12141,7 +12141,7 @@
                 <a:latin typeface="Calibri"/>
                 <a:ea typeface="Calibri"/>
               </a:rPr>
-              <a:t>Διπλωματική Εργασία</a:t>
+              <a:t>Diploma Thesis</a:t>
             </a:r>
             <a:endParaRPr/>
           </a:p>
@@ -12164,7 +12164,7 @@
         <p:spPr>
           <a:xfrm>
             <a:off x="457200" y="3260520"/>
-            <a:ext cx="7997040" cy="1748520"/>
+            <a:ext cx="7996680" cy="1748160"/>
           </a:xfrm>
           <a:prstGeom prst="rect">
             <a:avLst/>
@@ -12211,7 +12211,7 @@
         <p:spPr>
           <a:xfrm>
             <a:off x="8501040" y="6524280"/>
-            <a:ext cx="642240" cy="1080"/>
+            <a:ext cx="641880" cy="720"/>
           </a:xfrm>
           <a:prstGeom prst="straightConnector1">
             <a:avLst/>
@@ -12234,7 +12234,7 @@
         <p:spPr>
           <a:xfrm>
             <a:off x="5715000" y="6235560"/>
-            <a:ext cx="1853280" cy="573840"/>
+            <a:ext cx="1852920" cy="573480"/>
           </a:xfrm>
           <a:prstGeom prst="rect">
             <a:avLst/>
@@ -12254,7 +12254,7 @@
         <p:spPr>
           <a:xfrm>
             <a:off x="0" y="6524280"/>
-            <a:ext cx="5571360" cy="1080"/>
+            <a:ext cx="5571000" cy="720"/>
           </a:xfrm>
           <a:prstGeom prst="straightConnector1">
             <a:avLst/>
@@ -12277,7 +12277,7 @@
         <p:spPr>
           <a:xfrm>
             <a:off x="52560" y="5257800"/>
-            <a:ext cx="9035280" cy="975600"/>
+            <a:ext cx="9034920" cy="975240"/>
           </a:xfrm>
           <a:prstGeom prst="rect">
             <a:avLst/>
@@ -12297,7 +12297,7 @@
         <p:spPr>
           <a:xfrm>
             <a:off x="457200" y="2743200"/>
-            <a:ext cx="8226000" cy="2835360"/>
+            <a:ext cx="8225640" cy="2835000"/>
           </a:xfrm>
           <a:prstGeom prst="rect">
             <a:avLst/>
@@ -12331,7 +12331,7 @@
                 <a:latin typeface="Calibri"/>
                 <a:ea typeface="Calibri"/>
               </a:rPr>
-              <a:t>Θάλεια-Δήμητρα Δούδαλη</a:t>
+              <a:t>Thaleia-Dimitra Doudali</a:t>
             </a:r>
             <a:endParaRPr/>
           </a:p>
@@ -12346,7 +12346,7 @@
         <p:spPr>
           <a:xfrm>
             <a:off x="457200" y="748440"/>
-            <a:ext cx="8317800" cy="1656000"/>
+            <a:ext cx="8317440" cy="1655640"/>
           </a:xfrm>
           <a:prstGeom prst="rect">
             <a:avLst/>
@@ -12372,7 +12372,7 @@
                 <a:latin typeface="Calibri"/>
                 <a:ea typeface="Calibri"/>
               </a:rPr>
-              <a:t>Σχεδιασμός και Υλοποίηση Γεννήτριας Χωροχρονικών Δεδομένων Μεγάλου Όγκου για Αποτίμηση Υπηρεσιών Κοινωνικής Δικτύωσης</a:t>
+              <a:t>Performance evaluation of social networking services using a spatio-temporal and textual Big Data generator</a:t>
             </a:r>
             <a:endParaRPr/>
           </a:p>
@@ -12492,7 +12492,7 @@
         <p:spPr>
           <a:xfrm>
             <a:off x="457200" y="273600"/>
-            <a:ext cx="8226720" cy="1142640"/>
+            <a:ext cx="8226360" cy="1142280"/>
           </a:xfrm>
           <a:prstGeom prst="rect">
             <a:avLst/>
@@ -12533,7 +12533,7 @@
         <p:spPr>
           <a:xfrm>
             <a:off x="457200" y="1604520"/>
-            <a:ext cx="8227080" cy="3975120"/>
+            <a:ext cx="8226720" cy="3974760"/>
           </a:xfrm>
           <a:prstGeom prst="rect">
             <a:avLst/>
@@ -12723,7 +12723,7 @@
         <p:spPr>
           <a:xfrm>
             <a:off x="457200" y="273600"/>
-            <a:ext cx="8226720" cy="1142640"/>
+            <a:ext cx="8226360" cy="1142280"/>
           </a:xfrm>
           <a:prstGeom prst="rect">
             <a:avLst/>
@@ -12764,7 +12764,7 @@
         <p:spPr>
           <a:xfrm>
             <a:off x="457200" y="1604520"/>
-            <a:ext cx="8227080" cy="3975120"/>
+            <a:ext cx="8226720" cy="3974760"/>
           </a:xfrm>
           <a:prstGeom prst="rect">
             <a:avLst/>
@@ -12934,7 +12934,7 @@
         <p:spPr>
           <a:xfrm>
             <a:off x="457200" y="273600"/>
-            <a:ext cx="8228520" cy="1144080"/>
+            <a:ext cx="8228160" cy="1143720"/>
           </a:xfrm>
           <a:prstGeom prst="rect">
             <a:avLst/>
@@ -12981,7 +12981,7 @@
         <p:spPr>
           <a:xfrm>
             <a:off x="2577240" y="1418400"/>
-            <a:ext cx="4389480" cy="4424400"/>
+            <a:ext cx="4389120" cy="4424040"/>
           </a:xfrm>
           <a:prstGeom prst="rect">
             <a:avLst/>
@@ -13049,7 +13049,7 @@
         <p:spPr>
           <a:xfrm>
             <a:off x="457200" y="273600"/>
-            <a:ext cx="8228520" cy="1144080"/>
+            <a:ext cx="8228160" cy="1143720"/>
           </a:xfrm>
           <a:prstGeom prst="rect">
             <a:avLst/>
@@ -13096,7 +13096,7 @@
         <p:spPr>
           <a:xfrm>
             <a:off x="2549520" y="1418400"/>
-            <a:ext cx="4426920" cy="4400640"/>
+            <a:ext cx="4426560" cy="4400280"/>
           </a:xfrm>
           <a:prstGeom prst="rect">
             <a:avLst/>
@@ -13164,7 +13164,7 @@
         <p:spPr>
           <a:xfrm>
             <a:off x="457200" y="273600"/>
-            <a:ext cx="8228520" cy="1144080"/>
+            <a:ext cx="8228160" cy="1143720"/>
           </a:xfrm>
           <a:prstGeom prst="rect">
             <a:avLst/>
@@ -13211,7 +13211,7 @@
         <p:spPr>
           <a:xfrm>
             <a:off x="2565360" y="1418400"/>
-            <a:ext cx="4396680" cy="4405320"/>
+            <a:ext cx="4396320" cy="4404960"/>
           </a:xfrm>
           <a:prstGeom prst="rect">
             <a:avLst/>
@@ -13279,7 +13279,7 @@
         <p:spPr>
           <a:xfrm>
             <a:off x="457200" y="273600"/>
-            <a:ext cx="8228520" cy="1144080"/>
+            <a:ext cx="8228160" cy="1143720"/>
           </a:xfrm>
           <a:prstGeom prst="rect">
             <a:avLst/>
@@ -13326,7 +13326,7 @@
         <p:spPr>
           <a:xfrm>
             <a:off x="2557440" y="1418400"/>
-            <a:ext cx="4409280" cy="4400640"/>
+            <a:ext cx="4408920" cy="4400280"/>
           </a:xfrm>
           <a:prstGeom prst="rect">
             <a:avLst/>
@@ -13394,7 +13394,7 @@
         <p:spPr>
           <a:xfrm>
             <a:off x="457200" y="273600"/>
-            <a:ext cx="8228520" cy="1144080"/>
+            <a:ext cx="8228160" cy="1143720"/>
           </a:xfrm>
           <a:prstGeom prst="rect">
             <a:avLst/>
@@ -13441,7 +13441,7 @@
         <p:spPr>
           <a:xfrm>
             <a:off x="2557440" y="1418400"/>
-            <a:ext cx="4409280" cy="4400640"/>
+            <a:ext cx="4408920" cy="4400280"/>
           </a:xfrm>
           <a:prstGeom prst="rect">
             <a:avLst/>
@@ -13509,7 +13509,7 @@
         <p:spPr>
           <a:xfrm>
             <a:off x="457200" y="273600"/>
-            <a:ext cx="8228520" cy="1144080"/>
+            <a:ext cx="8228160" cy="1143720"/>
           </a:xfrm>
           <a:prstGeom prst="rect">
             <a:avLst/>
@@ -13556,7 +13556,7 @@
         <p:spPr>
           <a:xfrm>
             <a:off x="2569320" y="1418400"/>
-            <a:ext cx="4392720" cy="4410000"/>
+            <a:ext cx="4392360" cy="4409640"/>
           </a:xfrm>
           <a:prstGeom prst="rect">
             <a:avLst/>
@@ -13624,7 +13624,7 @@
         <p:spPr>
           <a:xfrm>
             <a:off x="457200" y="273600"/>
-            <a:ext cx="8226720" cy="1142640"/>
+            <a:ext cx="8226360" cy="1142280"/>
           </a:xfrm>
           <a:prstGeom prst="rect">
             <a:avLst/>
@@ -13671,7 +13671,7 @@
         <p:spPr>
           <a:xfrm>
             <a:off x="698760" y="1884960"/>
-            <a:ext cx="7745400" cy="3779280"/>
+            <a:ext cx="7745040" cy="3778920"/>
           </a:xfrm>
           <a:prstGeom prst="rect">
             <a:avLst/>
@@ -13739,7 +13739,7 @@
         <p:spPr>
           <a:xfrm>
             <a:off x="457200" y="273600"/>
-            <a:ext cx="8227080" cy="1143000"/>
+            <a:ext cx="8226720" cy="1142640"/>
           </a:xfrm>
           <a:prstGeom prst="rect">
             <a:avLst/>
@@ -13786,7 +13786,7 @@
         <p:spPr>
           <a:xfrm>
             <a:off x="1326240" y="1729440"/>
-            <a:ext cx="6490800" cy="3663360"/>
+            <a:ext cx="6490440" cy="3663000"/>
           </a:xfrm>
           <a:prstGeom prst="rect">
             <a:avLst/>
@@ -13854,7 +13854,7 @@
         <p:spPr>
           <a:xfrm>
             <a:off x="457200" y="128520"/>
-            <a:ext cx="8224200" cy="1429560"/>
+            <a:ext cx="8223840" cy="1429200"/>
           </a:xfrm>
           <a:prstGeom prst="rect">
             <a:avLst/>
@@ -13895,7 +13895,7 @@
         <p:spPr>
           <a:xfrm>
             <a:off x="457200" y="1602720"/>
-            <a:ext cx="8224200" cy="4520520"/>
+            <a:ext cx="8223840" cy="4520160"/>
           </a:xfrm>
           <a:prstGeom prst="rect">
             <a:avLst/>
@@ -14067,7 +14067,7 @@
         <p:spPr>
           <a:xfrm>
             <a:off x="457200" y="273600"/>
-            <a:ext cx="8228520" cy="1144440"/>
+            <a:ext cx="8228160" cy="1144080"/>
           </a:xfrm>
           <a:prstGeom prst="rect">
             <a:avLst/>
@@ -14108,7 +14108,7 @@
         <p:spPr>
           <a:xfrm>
             <a:off x="457200" y="1604520"/>
-            <a:ext cx="8228520" cy="3976560"/>
+            <a:ext cx="8228160" cy="3976200"/>
           </a:xfrm>
           <a:prstGeom prst="rect">
             <a:avLst/>
@@ -14280,7 +14280,7 @@
         <p:spPr>
           <a:xfrm>
             <a:off x="457200" y="273600"/>
-            <a:ext cx="8227080" cy="1143000"/>
+            <a:ext cx="8226720" cy="1142640"/>
           </a:xfrm>
           <a:prstGeom prst="rect">
             <a:avLst/>
@@ -14321,7 +14321,7 @@
         <p:spPr>
           <a:xfrm>
             <a:off x="457200" y="1604520"/>
-            <a:ext cx="8227440" cy="3975480"/>
+            <a:ext cx="8227080" cy="3975120"/>
           </a:xfrm>
           <a:prstGeom prst="rect">
             <a:avLst/>
@@ -14481,7 +14481,7 @@
         <p:spPr>
           <a:xfrm>
             <a:off x="457200" y="273600"/>
-            <a:ext cx="8227080" cy="1143000"/>
+            <a:ext cx="8226720" cy="1142640"/>
           </a:xfrm>
           <a:prstGeom prst="rect">
             <a:avLst/>
@@ -14528,7 +14528,7 @@
         <p:spPr>
           <a:xfrm>
             <a:off x="1600200" y="1147680"/>
-            <a:ext cx="5942880" cy="4561920"/>
+            <a:ext cx="5942520" cy="4561560"/>
           </a:xfrm>
           <a:prstGeom prst="rect">
             <a:avLst/>
@@ -14596,7 +14596,7 @@
         <p:spPr>
           <a:xfrm>
             <a:off x="457200" y="273600"/>
-            <a:ext cx="8228520" cy="1144440"/>
+            <a:ext cx="8228160" cy="1144080"/>
           </a:xfrm>
           <a:prstGeom prst="rect">
             <a:avLst/>
@@ -14640,7 +14640,7 @@
         <p:spPr>
           <a:xfrm>
             <a:off x="457200" y="1604520"/>
-            <a:ext cx="8228520" cy="3976560"/>
+            <a:ext cx="8228160" cy="3976200"/>
           </a:xfrm>
           <a:prstGeom prst="rect">
             <a:avLst/>
@@ -15010,7 +15010,7 @@
         <p:spPr>
           <a:xfrm>
             <a:off x="457200" y="273600"/>
-            <a:ext cx="8227080" cy="1143000"/>
+            <a:ext cx="8226720" cy="1142640"/>
           </a:xfrm>
           <a:prstGeom prst="rect">
             <a:avLst/>
@@ -15051,7 +15051,7 @@
         <p:spPr>
           <a:xfrm>
             <a:off x="457200" y="1604520"/>
-            <a:ext cx="8227440" cy="3975480"/>
+            <a:ext cx="8227080" cy="3975120"/>
           </a:xfrm>
           <a:prstGeom prst="rect">
             <a:avLst/>
@@ -15225,7 +15225,7 @@
         <p:spPr>
           <a:xfrm>
             <a:off x="457200" y="273600"/>
-            <a:ext cx="8227080" cy="1143000"/>
+            <a:ext cx="8226720" cy="1142640"/>
           </a:xfrm>
           <a:prstGeom prst="rect">
             <a:avLst/>
@@ -15272,7 +15272,7 @@
         <p:spPr>
           <a:xfrm>
             <a:off x="314640" y="2334600"/>
-            <a:ext cx="8512200" cy="2188080"/>
+            <a:ext cx="8511840" cy="2187720"/>
           </a:xfrm>
           <a:prstGeom prst="rect">
             <a:avLst/>
@@ -15340,7 +15340,7 @@
         <p:spPr>
           <a:xfrm>
             <a:off x="457200" y="273600"/>
-            <a:ext cx="8227080" cy="1143000"/>
+            <a:ext cx="8226720" cy="1142640"/>
           </a:xfrm>
           <a:prstGeom prst="rect">
             <a:avLst/>
@@ -15387,7 +15387,7 @@
         <p:spPr>
           <a:xfrm>
             <a:off x="1324800" y="1417320"/>
-            <a:ext cx="6491520" cy="4868280"/>
+            <a:ext cx="6491160" cy="4867920"/>
           </a:xfrm>
           <a:prstGeom prst="rect">
             <a:avLst/>
@@ -15455,7 +15455,7 @@
         <p:spPr>
           <a:xfrm>
             <a:off x="457200" y="273600"/>
-            <a:ext cx="8227080" cy="1143000"/>
+            <a:ext cx="8226720" cy="1142640"/>
           </a:xfrm>
           <a:prstGeom prst="rect">
             <a:avLst/>
@@ -15502,7 +15502,7 @@
         <p:spPr>
           <a:xfrm>
             <a:off x="1324800" y="1417320"/>
-            <a:ext cx="6491520" cy="4868280"/>
+            <a:ext cx="6491160" cy="4867920"/>
           </a:xfrm>
           <a:prstGeom prst="rect">
             <a:avLst/>
@@ -15570,7 +15570,7 @@
         <p:spPr>
           <a:xfrm>
             <a:off x="457200" y="273600"/>
-            <a:ext cx="8227080" cy="1143000"/>
+            <a:ext cx="8226720" cy="1142640"/>
           </a:xfrm>
           <a:prstGeom prst="rect">
             <a:avLst/>
@@ -15611,7 +15611,7 @@
         <p:spPr>
           <a:xfrm>
             <a:off x="457200" y="1604520"/>
-            <a:ext cx="8227440" cy="3975480"/>
+            <a:ext cx="8227080" cy="3975120"/>
           </a:xfrm>
           <a:prstGeom prst="rect">
             <a:avLst/>
@@ -15723,7 +15723,7 @@
         <p:spPr>
           <a:xfrm>
             <a:off x="457200" y="128520"/>
-            <a:ext cx="8224200" cy="1429560"/>
+            <a:ext cx="8223840" cy="1429200"/>
           </a:xfrm>
           <a:prstGeom prst="rect">
             <a:avLst/>
@@ -15770,7 +15770,7 @@
         <p:spPr>
           <a:xfrm>
             <a:off x="3351960" y="1891080"/>
-            <a:ext cx="2434680" cy="3075120"/>
+            <a:ext cx="2434320" cy="3074760"/>
           </a:xfrm>
           <a:prstGeom prst="rect">
             <a:avLst/>
@@ -15838,7 +15838,7 @@
         <p:spPr>
           <a:xfrm>
             <a:off x="457200" y="273600"/>
-            <a:ext cx="8226360" cy="1141920"/>
+            <a:ext cx="8226000" cy="1141560"/>
           </a:xfrm>
           <a:prstGeom prst="rect">
             <a:avLst/>
@@ -15879,7 +15879,7 @@
         <p:spPr>
           <a:xfrm>
             <a:off x="457200" y="1604520"/>
-            <a:ext cx="8226360" cy="3974400"/>
+            <a:ext cx="8226000" cy="3974040"/>
           </a:xfrm>
           <a:prstGeom prst="rect">
             <a:avLst/>
@@ -16059,7 +16059,7 @@
         <p:spPr>
           <a:xfrm>
             <a:off x="457200" y="273600"/>
-            <a:ext cx="8226360" cy="1141920"/>
+            <a:ext cx="8226000" cy="1141560"/>
           </a:xfrm>
           <a:prstGeom prst="rect">
             <a:avLst/>
@@ -16079,7 +16079,7 @@
         <p:spPr>
           <a:xfrm>
             <a:off x="457200" y="1604520"/>
-            <a:ext cx="8226360" cy="3974400"/>
+            <a:ext cx="8226000" cy="3974040"/>
           </a:xfrm>
           <a:prstGeom prst="rect">
             <a:avLst/>
@@ -16099,7 +16099,7 @@
         <p:spPr>
           <a:xfrm>
             <a:off x="457200" y="273600"/>
-            <a:ext cx="8226360" cy="1142280"/>
+            <a:ext cx="8226000" cy="1141920"/>
           </a:xfrm>
           <a:prstGeom prst="rect">
             <a:avLst/>
@@ -16140,7 +16140,7 @@
         <p:spPr>
           <a:xfrm>
             <a:off x="457200" y="1604520"/>
-            <a:ext cx="8226360" cy="3974400"/>
+            <a:ext cx="8226000" cy="3974040"/>
           </a:xfrm>
           <a:prstGeom prst="rect">
             <a:avLst/>
@@ -16312,7 +16312,7 @@
         <p:spPr>
           <a:xfrm>
             <a:off x="457200" y="273600"/>
-            <a:ext cx="8226720" cy="1142640"/>
+            <a:ext cx="8226360" cy="1142280"/>
           </a:xfrm>
           <a:prstGeom prst="rect">
             <a:avLst/>
@@ -16353,7 +16353,7 @@
         <p:spPr>
           <a:xfrm>
             <a:off x="457200" y="1604520"/>
-            <a:ext cx="8227080" cy="3975120"/>
+            <a:ext cx="8226720" cy="3974760"/>
           </a:xfrm>
           <a:prstGeom prst="rect">
             <a:avLst/>
@@ -16505,7 +16505,7 @@
         <p:spPr>
           <a:xfrm>
             <a:off x="457200" y="273600"/>
-            <a:ext cx="8226720" cy="1142640"/>
+            <a:ext cx="8226360" cy="1142280"/>
           </a:xfrm>
           <a:prstGeom prst="rect">
             <a:avLst/>
@@ -16552,7 +16552,7 @@
         <p:spPr>
           <a:xfrm>
             <a:off x="985320" y="2377800"/>
-            <a:ext cx="7172640" cy="1832760"/>
+            <a:ext cx="7172280" cy="1832400"/>
           </a:xfrm>
           <a:prstGeom prst="rect">
             <a:avLst/>
@@ -16620,7 +16620,7 @@
         <p:spPr>
           <a:xfrm>
             <a:off x="457200" y="273600"/>
-            <a:ext cx="8226720" cy="1142640"/>
+            <a:ext cx="8226360" cy="1142280"/>
           </a:xfrm>
           <a:prstGeom prst="rect">
             <a:avLst/>
@@ -16661,7 +16661,7 @@
         <p:spPr>
           <a:xfrm>
             <a:off x="457200" y="1604520"/>
-            <a:ext cx="8227080" cy="3975120"/>
+            <a:ext cx="8226720" cy="3974760"/>
           </a:xfrm>
           <a:prstGeom prst="rect">
             <a:avLst/>
@@ -16853,7 +16853,7 @@
         <p:spPr>
           <a:xfrm>
             <a:off x="457200" y="273600"/>
-            <a:ext cx="8226720" cy="1142640"/>
+            <a:ext cx="8226360" cy="1142280"/>
           </a:xfrm>
           <a:prstGeom prst="rect">
             <a:avLst/>
@@ -16894,7 +16894,7 @@
         <p:spPr>
           <a:xfrm>
             <a:off x="457200" y="1604520"/>
-            <a:ext cx="8227080" cy="3975120"/>
+            <a:ext cx="8226720" cy="3974760"/>
           </a:xfrm>
           <a:prstGeom prst="rect">
             <a:avLst/>
@@ -17112,7 +17112,7 @@
         <p:spPr>
           <a:xfrm>
             <a:off x="457200" y="273600"/>
-            <a:ext cx="8226720" cy="1142640"/>
+            <a:ext cx="8226360" cy="1142280"/>
           </a:xfrm>
           <a:prstGeom prst="rect">
             <a:avLst/>
@@ -17153,7 +17153,7 @@
         <p:spPr>
           <a:xfrm>
             <a:off x="457200" y="1604520"/>
-            <a:ext cx="8227080" cy="3975120"/>
+            <a:ext cx="8226720" cy="3974760"/>
           </a:xfrm>
           <a:prstGeom prst="rect">
             <a:avLst/>

</xml_diff>